<commit_message>
minor update to flowchart
</commit_message>
<xml_diff>
--- a/web/design/software_development_flowchart.pptx
+++ b/web/design/software_development_flowchart.pptx
@@ -4495,6 +4495,98 @@
           </a:fontRef>
         </p:style>
       </p:cxnSp>
+      <p:sp>
+        <p:nvSpPr>
+          <p:cNvPr id="62" name="Process 61">
+            <a:extLst>
+              <a:ext uri="{FF2B5EF4-FFF2-40B4-BE49-F238E27FC236}">
+                <a16:creationId xmlns:a16="http://schemas.microsoft.com/office/drawing/2014/main" id="{48566C87-6943-6B42-A165-C913DE83B331}"/>
+              </a:ext>
+            </a:extLst>
+          </p:cNvPr>
+          <p:cNvSpPr/>
+          <p:nvPr/>
+        </p:nvSpPr>
+        <p:spPr>
+          <a:xfrm>
+            <a:off x="9811625" y="1716510"/>
+            <a:ext cx="2176041" cy="667919"/>
+          </a:xfrm>
+          <a:prstGeom prst="flowChartProcess">
+            <a:avLst/>
+          </a:prstGeom>
+        </p:spPr>
+        <p:style>
+          <a:lnRef idx="2">
+            <a:schemeClr val="accent1">
+              <a:shade val="50000"/>
+            </a:schemeClr>
+          </a:lnRef>
+          <a:fillRef idx="1">
+            <a:schemeClr val="accent1"/>
+          </a:fillRef>
+          <a:effectRef idx="0">
+            <a:schemeClr val="accent1"/>
+          </a:effectRef>
+          <a:fontRef idx="minor">
+            <a:schemeClr val="lt1"/>
+          </a:fontRef>
+        </p:style>
+        <p:txBody>
+          <a:bodyPr rtlCol="0" anchor="ctr"/>
+          <a:lstStyle/>
+          <a:p>
+            <a:pPr algn="ctr"/>
+            <a:r>
+              <a:rPr lang="en-US" dirty="0"/>
+              <a:t>Create search-formatted URL</a:t>
+            </a:r>
+          </a:p>
+        </p:txBody>
+      </p:sp>
+      <p:cxnSp>
+        <p:nvCxnSpPr>
+          <p:cNvPr id="63" name="Elbow Connector 62">
+            <a:extLst>
+              <a:ext uri="{FF2B5EF4-FFF2-40B4-BE49-F238E27FC236}">
+                <a16:creationId xmlns:a16="http://schemas.microsoft.com/office/drawing/2014/main" id="{ABF82861-2726-EA41-9713-AD7DDDF6AB42}"/>
+              </a:ext>
+            </a:extLst>
+          </p:cNvPr>
+          <p:cNvCxnSpPr>
+            <a:cxnSpLocks/>
+            <a:stCxn id="45" idx="3"/>
+            <a:endCxn id="62" idx="0"/>
+          </p:cNvCxnSpPr>
+          <p:nvPr/>
+        </p:nvCxnSpPr>
+        <p:spPr>
+          <a:xfrm>
+            <a:off x="10689334" y="974677"/>
+            <a:ext cx="210312" cy="741833"/>
+          </a:xfrm>
+          <a:prstGeom prst="bentConnector2">
+            <a:avLst/>
+          </a:prstGeom>
+          <a:ln>
+            <a:tailEnd type="triangle"/>
+          </a:ln>
+        </p:spPr>
+        <p:style>
+          <a:lnRef idx="1">
+            <a:schemeClr val="accent1"/>
+          </a:lnRef>
+          <a:fillRef idx="0">
+            <a:schemeClr val="accent1"/>
+          </a:fillRef>
+          <a:effectRef idx="0">
+            <a:schemeClr val="accent1"/>
+          </a:effectRef>
+          <a:fontRef idx="minor">
+            <a:schemeClr val="tx1"/>
+          </a:fontRef>
+        </p:style>
+      </p:cxnSp>
     </p:spTree>
     <p:extLst>
       <p:ext uri="{BB962C8B-B14F-4D97-AF65-F5344CB8AC3E}">

</xml_diff>